<commit_message>
Lecture 01, code examples
</commit_message>
<xml_diff>
--- a/Doc/Lectures/01. Polymorphism/01.Polymorphism.pptx
+++ b/Doc/Lectures/01. Polymorphism/01.Polymorphism.pptx
@@ -10803,269 +10803,4 @@
   </a:objectDefaults>
   <a:extraClrSchemeLst/>
 </a:theme>
-</file>
-
-<file path=customXml/item1.xml><?xml version="1.0" encoding="utf-8"?>
-<?mso-contentType ?>
-<spe:Receivers xmlns:spe="http://schemas.microsoft.com/sharepoint/events">
-  <Receiver>
-    <Name>Document ID Generator</Name>
-    <Synchronization>Synchronous</Synchronization>
-    <Type>10001</Type>
-    <SequenceNumber>1000</SequenceNumber>
-    <Url/>
-    <Assembly>Microsoft.Office.DocumentManagement, Version=16.0.0.0, Culture=neutral, PublicKeyToken=71e9bce111e9429c</Assembly>
-    <Class>Microsoft.Office.DocumentManagement.Internal.DocIdHandler</Class>
-    <Data/>
-    <Filter/>
-  </Receiver>
-  <Receiver>
-    <Name>Document ID Generator</Name>
-    <Synchronization>Synchronous</Synchronization>
-    <Type>10002</Type>
-    <SequenceNumber>1001</SequenceNumber>
-    <Url/>
-    <Assembly>Microsoft.Office.DocumentManagement, Version=16.0.0.0, Culture=neutral, PublicKeyToken=71e9bce111e9429c</Assembly>
-    <Class>Microsoft.Office.DocumentManagement.Internal.DocIdHandler</Class>
-    <Data/>
-    <Filter/>
-  </Receiver>
-  <Receiver>
-    <Name>Document ID Generator</Name>
-    <Synchronization>Synchronous</Synchronization>
-    <Type>10004</Type>
-    <SequenceNumber>1002</SequenceNumber>
-    <Url/>
-    <Assembly>Microsoft.Office.DocumentManagement, Version=16.0.0.0, Culture=neutral, PublicKeyToken=71e9bce111e9429c</Assembly>
-    <Class>Microsoft.Office.DocumentManagement.Internal.DocIdHandler</Class>
-    <Data/>
-    <Filter/>
-  </Receiver>
-  <Receiver>
-    <Name>Document ID Generator</Name>
-    <Synchronization>Synchronous</Synchronization>
-    <Type>10006</Type>
-    <SequenceNumber>1003</SequenceNumber>
-    <Url/>
-    <Assembly>Microsoft.Office.DocumentManagement, Version=16.0.0.0, Culture=neutral, PublicKeyToken=71e9bce111e9429c</Assembly>
-    <Class>Microsoft.Office.DocumentManagement.Internal.DocIdHandler</Class>
-    <Data/>
-    <Filter/>
-  </Receiver>
-</spe:Receivers>
-</file>
-
-<file path=customXml/item2.xml><?xml version="1.0" encoding="utf-8"?>
-<?mso-contentType ?>
-<SharedContentType xmlns="Microsoft.SharePoint.Taxonomy.ContentTypeSync" SourceId="34c87397-5fc1-491e-85e7-d6110dbe9cbd" ContentTypeId="0x0101" PreviousValue="false"/>
-</file>
-
-<file path=customXml/item3.xml><?xml version="1.0" encoding="utf-8"?>
-<ct:contentTypeSchema xmlns:ct="http://schemas.microsoft.com/office/2006/metadata/contentType" xmlns:ma="http://schemas.microsoft.com/office/2006/metadata/properties/metaAttributes" ct:_="" ma:_="" ma:contentTypeName="Document" ma:contentTypeID="0x0101000EB2C4F2DE65DD4D899040435169D6AD" ma:contentTypeVersion="5" ma:contentTypeDescription="Create a new document." ma:contentTypeScope="" ma:versionID="f7840754d1d8e4867dd509ddc8f97baf">
-  <xsd:schema xmlns:xsd="http://www.w3.org/2001/XMLSchema" xmlns:xs="http://www.w3.org/2001/XMLSchema" xmlns:p="http://schemas.microsoft.com/office/2006/metadata/properties" xmlns:ns2="71c5aaf6-e6ce-465b-b873-5148d2a4c105" xmlns:ns3="c8c180be-4439-4554-a471-5a1d1f7db6cc" targetNamespace="http://schemas.microsoft.com/office/2006/metadata/properties" ma:root="true" ma:fieldsID="27017d4c3009af8706049aa5f3fe94f4" ns2:_="" ns3:_="">
-    <xsd:import namespace="71c5aaf6-e6ce-465b-b873-5148d2a4c105"/>
-    <xsd:import namespace="c8c180be-4439-4554-a471-5a1d1f7db6cc"/>
-    <xsd:element name="properties">
-      <xsd:complexType>
-        <xsd:sequence>
-          <xsd:element name="documentManagement">
-            <xsd:complexType>
-              <xsd:all>
-                <xsd:element ref="ns2:_dlc_DocId" minOccurs="0"/>
-                <xsd:element ref="ns2:_dlc_DocIdUrl" minOccurs="0"/>
-                <xsd:element ref="ns2:_dlc_DocIdPersistId" minOccurs="0"/>
-                <xsd:element ref="ns2:HideFromDelve" minOccurs="0"/>
-                <xsd:element ref="ns3:MediaServiceMetadata" minOccurs="0"/>
-                <xsd:element ref="ns3:MediaServiceFastMetadata" minOccurs="0"/>
-              </xsd:all>
-            </xsd:complexType>
-          </xsd:element>
-        </xsd:sequence>
-      </xsd:complexType>
-    </xsd:element>
-  </xsd:schema>
-  <xsd:schema xmlns:xsd="http://www.w3.org/2001/XMLSchema" xmlns:xs="http://www.w3.org/2001/XMLSchema" xmlns:dms="http://schemas.microsoft.com/office/2006/documentManagement/types" xmlns:pc="http://schemas.microsoft.com/office/infopath/2007/PartnerControls" targetNamespace="71c5aaf6-e6ce-465b-b873-5148d2a4c105" elementFormDefault="qualified">
-    <xsd:import namespace="http://schemas.microsoft.com/office/2006/documentManagement/types"/>
-    <xsd:import namespace="http://schemas.microsoft.com/office/infopath/2007/PartnerControls"/>
-    <xsd:element name="_dlc_DocId" ma:index="8" nillable="true" ma:displayName="Document ID Value" ma:description="The value of the document ID assigned to this item." ma:internalName="_dlc_DocId" ma:readOnly="true">
-      <xsd:simpleType>
-        <xsd:restriction base="dms:Text"/>
-      </xsd:simpleType>
-    </xsd:element>
-    <xsd:element name="_dlc_DocIdUrl" ma:index="9" nillable="true" ma:displayName="Document ID" ma:description="Permanent link to this document." ma:hidden="true" ma:internalName="_dlc_DocIdUrl" ma:readOnly="true">
-      <xsd:complexType>
-        <xsd:complexContent>
-          <xsd:extension base="dms:URL">
-            <xsd:sequence>
-              <xsd:element name="Url" type="dms:ValidUrl" minOccurs="0" nillable="true"/>
-              <xsd:element name="Description" type="xsd:string" nillable="true"/>
-            </xsd:sequence>
-          </xsd:extension>
-        </xsd:complexContent>
-      </xsd:complexType>
-    </xsd:element>
-    <xsd:element name="_dlc_DocIdPersistId" ma:index="10" nillable="true" ma:displayName="Persist ID" ma:description="Keep ID on add." ma:hidden="true" ma:internalName="_dlc_DocIdPersistId" ma:readOnly="true">
-      <xsd:simpleType>
-        <xsd:restriction base="dms:Boolean"/>
-      </xsd:simpleType>
-    </xsd:element>
-    <xsd:element name="HideFromDelve" ma:index="11" nillable="true" ma:displayName="HideFromDelve" ma:default="0" ma:internalName="HideFromDelve">
-      <xsd:simpleType>
-        <xsd:restriction base="dms:Boolean"/>
-      </xsd:simpleType>
-    </xsd:element>
-  </xsd:schema>
-  <xsd:schema xmlns:xsd="http://www.w3.org/2001/XMLSchema" xmlns:xs="http://www.w3.org/2001/XMLSchema" xmlns:dms="http://schemas.microsoft.com/office/2006/documentManagement/types" xmlns:pc="http://schemas.microsoft.com/office/infopath/2007/PartnerControls" targetNamespace="c8c180be-4439-4554-a471-5a1d1f7db6cc" elementFormDefault="qualified">
-    <xsd:import namespace="http://schemas.microsoft.com/office/2006/documentManagement/types"/>
-    <xsd:import namespace="http://schemas.microsoft.com/office/infopath/2007/PartnerControls"/>
-    <xsd:element name="MediaServiceMetadata" ma:index="12" nillable="true" ma:displayName="MediaServiceMetadata" ma:hidden="true" ma:internalName="MediaServiceMetadata" ma:readOnly="true">
-      <xsd:simpleType>
-        <xsd:restriction base="dms:Note"/>
-      </xsd:simpleType>
-    </xsd:element>
-    <xsd:element name="MediaServiceFastMetadata" ma:index="13" nillable="true" ma:displayName="MediaServiceFastMetadata" ma:hidden="true" ma:internalName="MediaServiceFastMetadata" ma:readOnly="true">
-      <xsd:simpleType>
-        <xsd:restriction base="dms:Note"/>
-      </xsd:simpleType>
-    </xsd:element>
-  </xsd:schema>
-  <xsd:schema xmlns="http://schemas.openxmlformats.org/package/2006/metadata/core-properties" xmlns:xsd="http://www.w3.org/2001/XMLSchema" xmlns:xsi="http://www.w3.org/2001/XMLSchema-instance" xmlns:dc="http://purl.org/dc/elements/1.1/" xmlns:dcterms="http://purl.org/dc/terms/" xmlns:odoc="http://schemas.microsoft.com/internal/obd" targetNamespace="http://schemas.openxmlformats.org/package/2006/metadata/core-properties" elementFormDefault="qualified" attributeFormDefault="unqualified" blockDefault="#all">
-    <xsd:import namespace="http://purl.org/dc/elements/1.1/" schemaLocation="http://dublincore.org/schemas/xmls/qdc/2003/04/02/dc.xsd"/>
-    <xsd:import namespace="http://purl.org/dc/terms/" schemaLocation="http://dublincore.org/schemas/xmls/qdc/2003/04/02/dcterms.xsd"/>
-    <xsd:element name="coreProperties" type="CT_coreProperties"/>
-    <xsd:complexType name="CT_coreProperties">
-      <xsd:all>
-        <xsd:element ref="dc:creator" minOccurs="0" maxOccurs="1"/>
-        <xsd:element ref="dcterms:created" minOccurs="0" maxOccurs="1"/>
-        <xsd:element ref="dc:identifier" minOccurs="0" maxOccurs="1"/>
-        <xsd:element name="contentType" minOccurs="0" maxOccurs="1" type="xsd:string" ma:index="0" ma:displayName="Content Type"/>
-        <xsd:element ref="dc:title" minOccurs="0" maxOccurs="1" ma:index="4" ma:displayName="Title"/>
-        <xsd:element ref="dc:subject" minOccurs="0" maxOccurs="1"/>
-        <xsd:element ref="dc:description" minOccurs="0" maxOccurs="1"/>
-        <xsd:element name="keywords" minOccurs="0" maxOccurs="1" type="xsd:string"/>
-        <xsd:element ref="dc:language" minOccurs="0" maxOccurs="1"/>
-        <xsd:element name="category" minOccurs="0" maxOccurs="1" type="xsd:string"/>
-        <xsd:element name="version" minOccurs="0" maxOccurs="1" type="xsd:string"/>
-        <xsd:element name="revision" minOccurs="0" maxOccurs="1" type="xsd:string">
-          <xsd:annotation>
-            <xsd:documentation>
-                        This value indicates the number of saves or revisions. The application is responsible for updating this value after each revision.
-                    </xsd:documentation>
-          </xsd:annotation>
-        </xsd:element>
-        <xsd:element name="lastModifiedBy" minOccurs="0" maxOccurs="1" type="xsd:string"/>
-        <xsd:element ref="dcterms:modified" minOccurs="0" maxOccurs="1"/>
-        <xsd:element name="contentStatus" minOccurs="0" maxOccurs="1" type="xsd:string"/>
-      </xsd:all>
-    </xsd:complexType>
-  </xsd:schema>
-  <xs:schema xmlns:pc="http://schemas.microsoft.com/office/infopath/2007/PartnerControls" xmlns:xs="http://www.w3.org/2001/XMLSchema" targetNamespace="http://schemas.microsoft.com/office/infopath/2007/PartnerControls" elementFormDefault="qualified" attributeFormDefault="unqualified">
-    <xs:element name="Person">
-      <xs:complexType>
-        <xs:sequence>
-          <xs:element ref="pc:DisplayName" minOccurs="0"/>
-          <xs:element ref="pc:AccountId" minOccurs="0"/>
-          <xs:element ref="pc:AccountType" minOccurs="0"/>
-        </xs:sequence>
-      </xs:complexType>
-    </xs:element>
-    <xs:element name="DisplayName" type="xs:string"/>
-    <xs:element name="AccountId" type="xs:string"/>
-    <xs:element name="AccountType" type="xs:string"/>
-    <xs:element name="BDCAssociatedEntity">
-      <xs:complexType>
-        <xs:sequence>
-          <xs:element ref="pc:BDCEntity" minOccurs="0" maxOccurs="unbounded"/>
-        </xs:sequence>
-        <xs:attribute ref="pc:EntityNamespace"/>
-        <xs:attribute ref="pc:EntityName"/>
-        <xs:attribute ref="pc:SystemInstanceName"/>
-        <xs:attribute ref="pc:AssociationName"/>
-      </xs:complexType>
-    </xs:element>
-    <xs:attribute name="EntityNamespace" type="xs:string"/>
-    <xs:attribute name="EntityName" type="xs:string"/>
-    <xs:attribute name="SystemInstanceName" type="xs:string"/>
-    <xs:attribute name="AssociationName" type="xs:string"/>
-    <xs:element name="BDCEntity">
-      <xs:complexType>
-        <xs:sequence>
-          <xs:element ref="pc:EntityDisplayName" minOccurs="0"/>
-          <xs:element ref="pc:EntityInstanceReference" minOccurs="0"/>
-          <xs:element ref="pc:EntityId1" minOccurs="0"/>
-          <xs:element ref="pc:EntityId2" minOccurs="0"/>
-          <xs:element ref="pc:EntityId3" minOccurs="0"/>
-          <xs:element ref="pc:EntityId4" minOccurs="0"/>
-          <xs:element ref="pc:EntityId5" minOccurs="0"/>
-        </xs:sequence>
-      </xs:complexType>
-    </xs:element>
-    <xs:element name="EntityDisplayName" type="xs:string"/>
-    <xs:element name="EntityInstanceReference" type="xs:string"/>
-    <xs:element name="EntityId1" type="xs:string"/>
-    <xs:element name="EntityId2" type="xs:string"/>
-    <xs:element name="EntityId3" type="xs:string"/>
-    <xs:element name="EntityId4" type="xs:string"/>
-    <xs:element name="EntityId5" type="xs:string"/>
-    <xs:element name="Terms">
-      <xs:complexType>
-        <xs:sequence>
-          <xs:element ref="pc:TermInfo" minOccurs="0" maxOccurs="unbounded"/>
-        </xs:sequence>
-      </xs:complexType>
-    </xs:element>
-    <xs:element name="TermInfo">
-      <xs:complexType>
-        <xs:sequence>
-          <xs:element ref="pc:TermName" minOccurs="0"/>
-          <xs:element ref="pc:TermId" minOccurs="0"/>
-        </xs:sequence>
-      </xs:complexType>
-    </xs:element>
-    <xs:element name="TermName" type="xs:string"/>
-    <xs:element name="TermId" type="xs:string"/>
-  </xs:schema>
-</ct:contentTypeSchema>
-</file>
-
-<file path=customXml/item4.xml><?xml version="1.0" encoding="utf-8"?>
-<?mso-contentType ?>
-<FormTemplates xmlns="http://schemas.microsoft.com/sharepoint/v3/contenttype/forms">
-  <Display>DocumentLibraryForm</Display>
-  <Edit>DocumentLibraryForm</Edit>
-  <New>DocumentLibraryForm</New>
-</FormTemplates>
-</file>
-
-<file path=customXml/item5.xml><?xml version="1.0" encoding="utf-8"?>
-<p:properties xmlns:p="http://schemas.microsoft.com/office/2006/metadata/properties" xmlns:xsi="http://www.w3.org/2001/XMLSchema-instance" xmlns:pc="http://schemas.microsoft.com/office/infopath/2007/PartnerControls">
-  <documentManagement>
-    <HideFromDelve xmlns="71c5aaf6-e6ce-465b-b873-5148d2a4c105">false</HideFromDelve>
-    <_dlc_DocId xmlns="71c5aaf6-e6ce-465b-b873-5148d2a4c105">LRIUPU4I3TNB-1378268647-53</_dlc_DocId>
-    <_dlc_DocIdUrl xmlns="71c5aaf6-e6ce-465b-b873-5148d2a4c105">
-      <Url>https://nokia.sharepoint.com/sites/KRKPKcoopeeration/_layouts/15/DocIdRedir.aspx?ID=LRIUPU4I3TNB-1378268647-53</Url>
-      <Description>LRIUPU4I3TNB-1378268647-53</Description>
-    </_dlc_DocIdUrl>
-  </documentManagement>
-</p:properties>
-</file>
-
-<file path=customXml/itemProps1.xml><?xml version="1.0" encoding="utf-8"?>
-<ds:datastoreItem xmlns:ds="http://schemas.openxmlformats.org/officeDocument/2006/customXml" ds:itemID="{6CF0564C-46EA-4025-903D-E76534F51F37}"/>
-</file>
-
-<file path=customXml/itemProps2.xml><?xml version="1.0" encoding="utf-8"?>
-<ds:datastoreItem xmlns:ds="http://schemas.openxmlformats.org/officeDocument/2006/customXml" ds:itemID="{79BF5211-8892-4FFD-B659-90B4DE3CCBBA}"/>
-</file>
-
-<file path=customXml/itemProps3.xml><?xml version="1.0" encoding="utf-8"?>
-<ds:datastoreItem xmlns:ds="http://schemas.openxmlformats.org/officeDocument/2006/customXml" ds:itemID="{7C79C8C0-6EC7-4087-AD43-C90E95CBA2E4}"/>
-</file>
-
-<file path=customXml/itemProps4.xml><?xml version="1.0" encoding="utf-8"?>
-<ds:datastoreItem xmlns:ds="http://schemas.openxmlformats.org/officeDocument/2006/customXml" ds:itemID="{1B5F9E69-394E-4FF2-8C7F-6B3D0E4D12EE}"/>
-</file>
-
-<file path=customXml/itemProps5.xml><?xml version="1.0" encoding="utf-8"?>
-<ds:datastoreItem xmlns:ds="http://schemas.openxmlformats.org/officeDocument/2006/customXml" ds:itemID="{CB19A37C-E04D-4571-B5E8-5408F3E3FD7E}"/>
 </file>
</xml_diff>